<commit_message>
+Fixed my own name spelling
</commit_message>
<xml_diff>
--- a/Team-alkonost.pptx
+++ b/Team-alkonost.pptx
@@ -112,6 +112,22 @@
       </a:defRPr>
     </a:lvl9pPr>
   </p:defaultTextStyle>
+  <p:extLst>
+    <p:ext uri="{EFAFB233-063F-42B5-8137-9DF3F51BA10A}">
+      <p15:sldGuideLst xmlns:p15="http://schemas.microsoft.com/office/powerpoint/2012/main">
+        <p15:guide id="1" orient="horz" pos="2160">
+          <p15:clr>
+            <a:srgbClr val="A4A3A4"/>
+          </p15:clr>
+        </p15:guide>
+        <p15:guide id="2" pos="2880">
+          <p15:clr>
+            <a:srgbClr val="A4A3A4"/>
+          </p15:clr>
+        </p15:guide>
+      </p15:sldGuideLst>
+    </p:ext>
+  </p:extLst>
 </p:presentation>
 </file>
 
@@ -197,7 +213,7 @@
           <a:p>
             <a:fld id="{4B2BB6EB-2D45-4763-B1C2-D903CFF60FD3}" type="datetimeFigureOut">
               <a:rPr lang="bg-BG" smtClean="0"/>
-              <a:t>21.12.2015 г.</a:t>
+              <a:t>22.12.2015 г.</a:t>
             </a:fld>
             <a:endParaRPr lang="bg-BG"/>
           </a:p>
@@ -608,7 +624,7 @@
           <a:p>
             <a:fld id="{5C17465E-989E-4188-AF79-6F4EEDCCC298}" type="datetimeFigureOut">
               <a:rPr lang="bg-BG" smtClean="0"/>
-              <a:t>21.12.2015 г.</a:t>
+              <a:t>22.12.2015 г.</a:t>
             </a:fld>
             <a:endParaRPr lang="bg-BG"/>
           </a:p>
@@ -924,7 +940,7 @@
           <a:p>
             <a:fld id="{5C17465E-989E-4188-AF79-6F4EEDCCC298}" type="datetimeFigureOut">
               <a:rPr lang="bg-BG" smtClean="0"/>
-              <a:t>21.12.2015 г.</a:t>
+              <a:t>22.12.2015 г.</a:t>
             </a:fld>
             <a:endParaRPr lang="bg-BG"/>
           </a:p>
@@ -1099,7 +1115,7 @@
           <a:p>
             <a:fld id="{5C17465E-989E-4188-AF79-6F4EEDCCC298}" type="datetimeFigureOut">
               <a:rPr lang="bg-BG" smtClean="0"/>
-              <a:t>21.12.2015 г.</a:t>
+              <a:t>22.12.2015 г.</a:t>
             </a:fld>
             <a:endParaRPr lang="bg-BG"/>
           </a:p>
@@ -1217,7 +1233,7 @@
           <a:p>
             <a:fld id="{5C17465E-989E-4188-AF79-6F4EEDCCC298}" type="datetimeFigureOut">
               <a:rPr lang="bg-BG" smtClean="0"/>
-              <a:t>21.12.2015 г.</a:t>
+              <a:t>22.12.2015 г.</a:t>
             </a:fld>
             <a:endParaRPr lang="bg-BG"/>
           </a:p>
@@ -1515,7 +1531,7 @@
           <a:p>
             <a:fld id="{5C17465E-989E-4188-AF79-6F4EEDCCC298}" type="datetimeFigureOut">
               <a:rPr lang="bg-BG" smtClean="0"/>
-              <a:t>21.12.2015 г.</a:t>
+              <a:t>22.12.2015 г.</a:t>
             </a:fld>
             <a:endParaRPr lang="bg-BG"/>
           </a:p>
@@ -1808,7 +1824,7 @@
           <a:p>
             <a:fld id="{5C17465E-989E-4188-AF79-6F4EEDCCC298}" type="datetimeFigureOut">
               <a:rPr lang="bg-BG" smtClean="0"/>
-              <a:t>21.12.2015 г.</a:t>
+              <a:t>22.12.2015 г.</a:t>
             </a:fld>
             <a:endParaRPr lang="bg-BG"/>
           </a:p>
@@ -2236,7 +2252,7 @@
           <a:p>
             <a:fld id="{5C17465E-989E-4188-AF79-6F4EEDCCC298}" type="datetimeFigureOut">
               <a:rPr lang="bg-BG" smtClean="0"/>
-              <a:t>21.12.2015 г.</a:t>
+              <a:t>22.12.2015 г.</a:t>
             </a:fld>
             <a:endParaRPr lang="bg-BG"/>
           </a:p>
@@ -2354,7 +2370,7 @@
           <a:p>
             <a:fld id="{5C17465E-989E-4188-AF79-6F4EEDCCC298}" type="datetimeFigureOut">
               <a:rPr lang="bg-BG" smtClean="0"/>
-              <a:t>21.12.2015 г.</a:t>
+              <a:t>22.12.2015 г.</a:t>
             </a:fld>
             <a:endParaRPr lang="bg-BG"/>
           </a:p>
@@ -2444,7 +2460,7 @@
           <a:p>
             <a:fld id="{5C17465E-989E-4188-AF79-6F4EEDCCC298}" type="datetimeFigureOut">
               <a:rPr lang="bg-BG" smtClean="0"/>
-              <a:t>21.12.2015 г.</a:t>
+              <a:t>22.12.2015 г.</a:t>
             </a:fld>
             <a:endParaRPr lang="bg-BG"/>
           </a:p>
@@ -2694,7 +2710,7 @@
           <a:p>
             <a:fld id="{5C17465E-989E-4188-AF79-6F4EEDCCC298}" type="datetimeFigureOut">
               <a:rPr lang="bg-BG" smtClean="0"/>
-              <a:t>21.12.2015 г.</a:t>
+              <a:t>22.12.2015 г.</a:t>
             </a:fld>
             <a:endParaRPr lang="bg-BG"/>
           </a:p>
@@ -3210,7 +3226,7 @@
           <a:p>
             <a:fld id="{5C17465E-989E-4188-AF79-6F4EEDCCC298}" type="datetimeFigureOut">
               <a:rPr lang="bg-BG" smtClean="0"/>
-              <a:t>21.12.2015 г.</a:t>
+              <a:t>22.12.2015 г.</a:t>
             </a:fld>
             <a:endParaRPr lang="bg-BG"/>
           </a:p>
@@ -3440,7 +3456,7 @@
           <a:p>
             <a:fld id="{5C17465E-989E-4188-AF79-6F4EEDCCC298}" type="datetimeFigureOut">
               <a:rPr lang="bg-BG" smtClean="0"/>
-              <a:t>21.12.2015 г.</a:t>
+              <a:t>22.12.2015 г.</a:t>
             </a:fld>
             <a:endParaRPr lang="bg-BG"/>
           </a:p>
@@ -5345,15 +5361,11 @@
           </a:p>
           <a:p>
             <a:r>
-              <a:rPr lang="en-US" sz="2800" dirty="0" err="1" smtClean="0"/>
-              <a:t>Yunak</a:t>
-            </a:r>
-            <a:r>
-              <a:rPr lang="en-US" sz="2800" dirty="0" smtClean="0"/>
-              <a:t> </a:t>
-            </a:r>
-            <a:r>
-              <a:rPr lang="en-US" sz="2800" dirty="0" err="1" smtClean="0"/>
+              <a:rPr lang="en-US" sz="2800" smtClean="0"/>
+              <a:t>Stefan </a:t>
+            </a:r>
+            <a:r>
+              <a:rPr lang="en-US" sz="2800" smtClean="0"/>
               <a:t>Iliev</a:t>
             </a:r>
             <a:endParaRPr lang="en-US" sz="2800" dirty="0" smtClean="0"/>

</xml_diff>